<commit_message>
Arreglos de ortografía en el Documento
</commit_message>
<xml_diff>
--- a/Documento/Presentacion.pptx
+++ b/Documento/Presentacion.pptx
@@ -21,14 +21,14 @@
   <p:notesSz cx="6858000" cy="9144000"/>
   <p:embeddedFontLst>
     <p:embeddedFont>
-      <p:font typeface="Montserrat SemiBold" panose="00000700000000000000" pitchFamily="2" charset="0"/>
+      <p:font typeface="Courier Prime" panose="020B0604020202020204" charset="0"/>
       <p:regular r:id="rId11"/>
       <p:bold r:id="rId12"/>
       <p:italic r:id="rId13"/>
       <p:boldItalic r:id="rId14"/>
     </p:embeddedFont>
     <p:embeddedFont>
-      <p:font typeface="Courier Prime" panose="020B0604020202020204" charset="0"/>
+      <p:font typeface="Montserrat SemiBold" panose="020B0604020202020204" charset="0"/>
       <p:regular r:id="rId15"/>
       <p:bold r:id="rId16"/>
       <p:italic r:id="rId17"/>
@@ -264,6 +264,11 @@
       </a:defRPr>
     </a:lvl9pPr>
   </p:defaultTextStyle>
+  <p:extLst>
+    <p:ext uri="{EFAFB233-063F-42B5-8137-9DF3F51BA10A}">
+      <p15:sldGuideLst xmlns:p15="http://schemas.microsoft.com/office/powerpoint/2012/main"/>
+    </p:ext>
+  </p:extLst>
 </p:presentation>
 </file>
 
@@ -800,7 +805,7 @@
               </a:spcAft>
               <a:buNone/>
             </a:pPr>
-            <a:endParaRPr/>
+            <a:endParaRPr dirty="0"/>
           </a:p>
         </p:txBody>
       </p:sp>
@@ -904,7 +909,7 @@
               </a:spcAft>
               <a:buNone/>
             </a:pPr>
-            <a:endParaRPr/>
+            <a:endParaRPr dirty="0"/>
           </a:p>
         </p:txBody>
       </p:sp>
@@ -1008,7 +1013,7 @@
               </a:spcAft>
               <a:buNone/>
             </a:pPr>
-            <a:endParaRPr/>
+            <a:endParaRPr dirty="0"/>
           </a:p>
         </p:txBody>
       </p:sp>
@@ -1117,7 +1122,7 @@
               </a:spcAft>
               <a:buNone/>
             </a:pPr>
-            <a:endParaRPr/>
+            <a:endParaRPr dirty="0"/>
           </a:p>
         </p:txBody>
       </p:sp>
@@ -1221,7 +1226,7 @@
               </a:spcAft>
               <a:buNone/>
             </a:pPr>
-            <a:endParaRPr/>
+            <a:endParaRPr dirty="0"/>
           </a:p>
         </p:txBody>
       </p:sp>
@@ -1325,7 +1330,7 @@
               </a:spcAft>
               <a:buNone/>
             </a:pPr>
-            <a:endParaRPr/>
+            <a:endParaRPr dirty="0"/>
           </a:p>
         </p:txBody>
       </p:sp>
@@ -1434,7 +1439,7 @@
               </a:spcAft>
               <a:buNone/>
             </a:pPr>
-            <a:endParaRPr/>
+            <a:endParaRPr dirty="0"/>
           </a:p>
         </p:txBody>
       </p:sp>
@@ -1543,7 +1548,7 @@
               </a:spcAft>
               <a:buNone/>
             </a:pPr>
-            <a:endParaRPr/>
+            <a:endParaRPr dirty="0"/>
           </a:p>
         </p:txBody>
       </p:sp>
@@ -1638,7 +1643,7 @@
                 <a:rPr lang="en"/>
                 <a:t>&lt;&lt;</a:t>
               </a:r>
-              <a:endParaRPr/>
+              <a:endParaRPr dirty="0"/>
             </a:p>
           </p:txBody>
         </p:sp>
@@ -1678,7 +1683,7 @@
                 </a:spcAft>
                 <a:buNone/>
               </a:pPr>
-              <a:endParaRPr/>
+              <a:endParaRPr dirty="0"/>
             </a:p>
           </p:txBody>
         </p:sp>
@@ -1719,7 +1724,7 @@
               </a:spcAft>
               <a:buNone/>
             </a:pPr>
-            <a:endParaRPr/>
+            <a:endParaRPr dirty="0"/>
           </a:p>
         </p:txBody>
       </p:sp>
@@ -1840,7 +1845,7 @@
                 </a:spcAft>
                 <a:buNone/>
               </a:pPr>
-              <a:endParaRPr/>
+              <a:endParaRPr dirty="0"/>
             </a:p>
           </p:txBody>
         </p:sp>
@@ -1880,7 +1885,7 @@
                 </a:spcAft>
                 <a:buNone/>
               </a:pPr>
-              <a:endParaRPr/>
+              <a:endParaRPr dirty="0"/>
             </a:p>
           </p:txBody>
         </p:sp>
@@ -2002,7 +2007,7 @@
                 </a:spcAft>
                 <a:buNone/>
               </a:pPr>
-              <a:endParaRPr/>
+              <a:endParaRPr dirty="0"/>
             </a:p>
           </p:txBody>
         </p:sp>
@@ -2042,7 +2047,7 @@
                 </a:spcAft>
                 <a:buNone/>
               </a:pPr>
-              <a:endParaRPr/>
+              <a:endParaRPr dirty="0"/>
             </a:p>
           </p:txBody>
         </p:sp>
@@ -2082,7 +2087,7 @@
                 </a:spcAft>
                 <a:buNone/>
               </a:pPr>
-              <a:endParaRPr/>
+              <a:endParaRPr dirty="0"/>
             </a:p>
           </p:txBody>
         </p:sp>
@@ -2123,7 +2128,7 @@
               </a:spcAft>
               <a:buNone/>
             </a:pPr>
-            <a:endParaRPr/>
+            <a:endParaRPr dirty="0"/>
           </a:p>
         </p:txBody>
       </p:sp>
@@ -2167,7 +2172,7 @@
               </a:spcAft>
               <a:buNone/>
             </a:pPr>
-            <a:endParaRPr/>
+            <a:endParaRPr dirty="0"/>
           </a:p>
         </p:txBody>
       </p:sp>
@@ -2766,7 +2771,7 @@
                 </a:spcAft>
                 <a:buNone/>
               </a:pPr>
-              <a:endParaRPr/>
+              <a:endParaRPr dirty="0"/>
             </a:p>
           </p:txBody>
         </p:sp>
@@ -2806,7 +2811,7 @@
                 </a:spcAft>
                 <a:buNone/>
               </a:pPr>
-              <a:endParaRPr/>
+              <a:endParaRPr dirty="0"/>
             </a:p>
           </p:txBody>
         </p:sp>
@@ -2846,7 +2851,7 @@
                 </a:spcAft>
                 <a:buNone/>
               </a:pPr>
-              <a:endParaRPr/>
+              <a:endParaRPr dirty="0"/>
             </a:p>
           </p:txBody>
         </p:sp>
@@ -3205,7 +3210,7 @@
                 </a:spcAft>
                 <a:buNone/>
               </a:pPr>
-              <a:endParaRPr/>
+              <a:endParaRPr dirty="0"/>
             </a:p>
           </p:txBody>
         </p:sp>
@@ -3652,7 +3657,7 @@
               </a:spcAft>
               <a:buNone/>
             </a:pPr>
-            <a:endParaRPr/>
+            <a:endParaRPr dirty="0"/>
           </a:p>
         </p:txBody>
       </p:sp>
@@ -3970,7 +3975,7 @@
                 </a:spcAft>
                 <a:buNone/>
               </a:pPr>
-              <a:endParaRPr/>
+              <a:endParaRPr dirty="0"/>
             </a:p>
           </p:txBody>
         </p:sp>
@@ -4029,7 +4034,7 @@
                 </a:spcAft>
                 <a:buNone/>
               </a:pPr>
-              <a:endParaRPr/>
+              <a:endParaRPr dirty="0"/>
             </a:p>
           </p:txBody>
         </p:sp>
@@ -4069,7 +4074,7 @@
                 </a:spcAft>
                 <a:buNone/>
               </a:pPr>
-              <a:endParaRPr>
+              <a:endParaRPr dirty="0">
                 <a:solidFill>
                   <a:schemeClr val="accent1"/>
                 </a:solidFill>
@@ -4113,7 +4118,7 @@
                 </a:spcAft>
                 <a:buNone/>
               </a:pPr>
-              <a:endParaRPr>
+              <a:endParaRPr dirty="0">
                 <a:solidFill>
                   <a:schemeClr val="accent1"/>
                 </a:solidFill>
@@ -4172,7 +4177,7 @@
                 </a:spcAft>
                 <a:buNone/>
               </a:pPr>
-              <a:endParaRPr>
+              <a:endParaRPr dirty="0">
                 <a:solidFill>
                   <a:schemeClr val="accent1"/>
                 </a:solidFill>
@@ -4216,7 +4221,7 @@
                 </a:spcAft>
                 <a:buNone/>
               </a:pPr>
-              <a:endParaRPr>
+              <a:endParaRPr dirty="0">
                 <a:solidFill>
                   <a:schemeClr val="accent1"/>
                 </a:solidFill>
@@ -4279,7 +4284,7 @@
                 </a:spcAft>
                 <a:buNone/>
               </a:pPr>
-              <a:endParaRPr/>
+              <a:endParaRPr dirty="0"/>
             </a:p>
           </p:txBody>
         </p:sp>
@@ -4319,7 +4324,7 @@
                 </a:spcAft>
                 <a:buNone/>
               </a:pPr>
-              <a:endParaRPr>
+              <a:endParaRPr dirty="0">
                 <a:solidFill>
                   <a:schemeClr val="accent1"/>
                 </a:solidFill>
@@ -4680,7 +4685,7 @@
               </a:spcAft>
               <a:buNone/>
             </a:pPr>
-            <a:endParaRPr/>
+            <a:endParaRPr dirty="0"/>
           </a:p>
         </p:txBody>
       </p:sp>
@@ -4738,7 +4743,7 @@
                 </a:spcAft>
                 <a:buNone/>
               </a:pPr>
-              <a:endParaRPr/>
+              <a:endParaRPr dirty="0"/>
             </a:p>
           </p:txBody>
         </p:sp>
@@ -4778,7 +4783,7 @@
                 </a:spcAft>
                 <a:buNone/>
               </a:pPr>
-              <a:endParaRPr>
+              <a:endParaRPr dirty="0">
                 <a:solidFill>
                   <a:schemeClr val="accent1"/>
                 </a:solidFill>
@@ -4822,7 +4827,7 @@
                 </a:spcAft>
                 <a:buNone/>
               </a:pPr>
-              <a:endParaRPr>
+              <a:endParaRPr dirty="0">
                 <a:solidFill>
                   <a:schemeClr val="accent1"/>
                 </a:solidFill>
@@ -4948,7 +4953,7 @@
                 </a:spcAft>
                 <a:buNone/>
               </a:pPr>
-              <a:endParaRPr/>
+              <a:endParaRPr dirty="0"/>
             </a:p>
           </p:txBody>
         </p:sp>
@@ -5246,7 +5251,7 @@
                   </a:spcAft>
                   <a:buNone/>
                 </a:pPr>
-                <a:endParaRPr/>
+                <a:endParaRPr dirty="0"/>
               </a:p>
             </p:txBody>
           </p:sp>
@@ -5286,7 +5291,7 @@
                   </a:spcAft>
                   <a:buNone/>
                 </a:pPr>
-                <a:endParaRPr/>
+                <a:endParaRPr dirty="0"/>
               </a:p>
             </p:txBody>
           </p:sp>
@@ -5327,7 +5332,7 @@
                 </a:spcAft>
                 <a:buNone/>
               </a:pPr>
-              <a:endParaRPr/>
+              <a:endParaRPr dirty="0"/>
             </a:p>
           </p:txBody>
         </p:sp>
@@ -5463,7 +5468,7 @@
                   </a:spcAft>
                   <a:buNone/>
                 </a:pPr>
-                <a:endParaRPr/>
+                <a:endParaRPr dirty="0"/>
               </a:p>
             </p:txBody>
           </p:sp>
@@ -5503,7 +5508,7 @@
                   </a:spcAft>
                   <a:buNone/>
                 </a:pPr>
-                <a:endParaRPr/>
+                <a:endParaRPr dirty="0"/>
               </a:p>
             </p:txBody>
           </p:sp>
@@ -6778,7 +6783,7 @@
               <a:buNone/>
             </a:pPr>
             <a:r>
-              <a:rPr lang="en" dirty="0" smtClean="0"/>
+              <a:rPr lang="en" dirty="0"/>
               <a:t>Help-DesK</a:t>
             </a:r>
             <a:endParaRPr dirty="0"/>
@@ -6820,73 +6825,44 @@
               <a:buNone/>
             </a:pPr>
             <a:r>
-              <a:rPr lang="es-SV" dirty="0" smtClean="0"/>
+              <a:rPr lang="es-SV" dirty="0"/>
               <a:t>Integrantes:</a:t>
             </a:r>
           </a:p>
           <a:p>
             <a:pPr marL="0" lvl="0" indent="0"/>
             <a:r>
-              <a:rPr lang="es-SV" dirty="0" err="1"/>
-              <a:t>Árevalo</a:t>
+              <a:rPr lang="es-SV" dirty="0"/>
+              <a:t>Arévalo Henríquez, Erick Fabricio	AH180223</a:t>
             </a:r>
-            <a:r>
-              <a:rPr lang="es-SV" dirty="0"/>
-              <a:t> Henríquez, Erick Fabricio	</a:t>
-            </a:r>
-            <a:r>
-              <a:rPr lang="es-SV" dirty="0" smtClean="0"/>
-              <a:t>AH180223</a:t>
-            </a:r>
-            <a:endParaRPr lang="es-SV" dirty="0"/>
           </a:p>
           <a:p>
             <a:pPr marL="0" lvl="0" indent="0"/>
             <a:r>
               <a:rPr lang="es-SV" dirty="0"/>
-              <a:t>Barrera Flamenco, Edgard Alexander	</a:t>
+              <a:t>Barrera Flamenco, Edgard Alexander	BF180436</a:t>
             </a:r>
-            <a:r>
-              <a:rPr lang="es-SV" dirty="0" smtClean="0"/>
-              <a:t>BF180436</a:t>
-            </a:r>
-            <a:endParaRPr lang="es-SV" dirty="0"/>
           </a:p>
           <a:p>
             <a:pPr marL="0" lvl="0" indent="0"/>
             <a:r>
               <a:rPr lang="es-SV" dirty="0"/>
-              <a:t>Flores Reyes, Miguel Ángel		</a:t>
+              <a:t>Flores Reyes, Miguel Ángel		FR180116</a:t>
             </a:r>
-            <a:r>
-              <a:rPr lang="es-SV" dirty="0" smtClean="0"/>
-              <a:t>FR180116</a:t>
-            </a:r>
-            <a:endParaRPr lang="es-SV" dirty="0"/>
           </a:p>
           <a:p>
             <a:pPr marL="0" lvl="0" indent="0"/>
             <a:r>
               <a:rPr lang="es-SV" dirty="0"/>
-              <a:t>Meléndez Martínez, Miguel Alejandro	</a:t>
+              <a:t>Meléndez Martínez, Miguel Alejandro	MM180363</a:t>
             </a:r>
-            <a:r>
-              <a:rPr lang="es-SV" dirty="0" smtClean="0"/>
-              <a:t>MM180363</a:t>
-            </a:r>
-            <a:endParaRPr lang="es-SV" dirty="0"/>
           </a:p>
           <a:p>
             <a:pPr marL="0" lvl="0" indent="0"/>
             <a:r>
               <a:rPr lang="es-SV" dirty="0"/>
-              <a:t>Ochoa Ramos, Ricardo José		</a:t>
+              <a:t>Ochoa Ramos, Ricardo José		OR190251</a:t>
             </a:r>
-            <a:r>
-              <a:rPr lang="es-SV" dirty="0" smtClean="0"/>
-              <a:t>OR190251</a:t>
-            </a:r>
-            <a:endParaRPr lang="es-SV" dirty="0"/>
           </a:p>
           <a:p>
             <a:pPr marL="0" lvl="0" indent="0" algn="ctr" rtl="0">
@@ -6898,7 +6874,7 @@
               </a:spcAft>
               <a:buNone/>
             </a:pPr>
-            <a:endParaRPr lang="es-SV" dirty="0" smtClean="0"/>
+            <a:endParaRPr lang="es-SV" dirty="0"/>
           </a:p>
           <a:p>
             <a:pPr marL="0" lvl="0" indent="0" algn="ctr" rtl="0">
@@ -6919,13 +6895,6 @@
   <p:clrMapOvr>
     <a:masterClrMapping/>
   </p:clrMapOvr>
-  <p:timing>
-    <p:tnLst>
-      <p:par>
-        <p:cTn id="1" dur="indefinite" restart="never" nodeType="tmRoot"/>
-      </p:par>
-    </p:tnLst>
-  </p:timing>
 </p:sld>
 </file>
 
@@ -6989,7 +6958,7 @@
               <a:buNone/>
             </a:pPr>
             <a:r>
-              <a:rPr lang="en" dirty="0" smtClean="0"/>
+              <a:rPr lang="en" dirty="0"/>
               <a:t>Alcances</a:t>
             </a:r>
             <a:endParaRPr dirty="0">
@@ -7051,11 +7020,7 @@
             </a:pPr>
             <a:r>
               <a:rPr lang="es-SV" dirty="0"/>
-              <a:t>Implementar todas las exigencias pedidas por el problema planteado de manera sencilla y </a:t>
-            </a:r>
-            <a:r>
-              <a:rPr lang="es-SV" dirty="0" smtClean="0"/>
-              <a:t>eficiente.</a:t>
+              <a:t>Implementar todas las exigencias pedidas por el problema planteado de manera sencilla y eficiente.</a:t>
             </a:r>
             <a:endParaRPr lang="es-SV" sz="1000" dirty="0"/>
           </a:p>
@@ -7070,19 +7035,7 @@
             </a:pPr>
             <a:r>
               <a:rPr lang="es-SV" dirty="0"/>
-              <a:t>Reducir el tiempo de respuesta por parte de los técnicos en la </a:t>
-            </a:r>
-            <a:r>
-              <a:rPr lang="es-SV" dirty="0" smtClean="0"/>
-              <a:t>solución </a:t>
-            </a:r>
-            <a:r>
-              <a:rPr lang="es-SV" dirty="0"/>
-              <a:t>de </a:t>
-            </a:r>
-            <a:r>
-              <a:rPr lang="es-SV" dirty="0" smtClean="0"/>
-              <a:t>los problemas .</a:t>
+              <a:t>Reducir el tiempo de respuesta por parte de los técnicos en la solución de los problemas .</a:t>
             </a:r>
           </a:p>
           <a:p>
@@ -7096,11 +7049,7 @@
             </a:pPr>
             <a:r>
               <a:rPr lang="es-SV" dirty="0"/>
-              <a:t>Utilizar las herramientas más actuales de los Lenguajes de </a:t>
-            </a:r>
-            <a:r>
-              <a:rPr lang="es-SV" dirty="0" smtClean="0"/>
-              <a:t>maquetación .</a:t>
+              <a:t>Utilizar las herramientas más actuales de los Lenguajes de maquetación .</a:t>
             </a:r>
           </a:p>
           <a:p>
@@ -7114,11 +7063,7 @@
             </a:pPr>
             <a:r>
               <a:rPr lang="es-SV" dirty="0"/>
-              <a:t>Reducir el tiempo en que un usuario recibe </a:t>
-            </a:r>
-            <a:r>
-              <a:rPr lang="es-SV" dirty="0" smtClean="0"/>
-              <a:t>respuesta.</a:t>
+              <a:t>Reducir el tiempo en que un usuario recibe respuesta.</a:t>
             </a:r>
             <a:endParaRPr sz="1000" dirty="0"/>
           </a:p>
@@ -7129,13 +7074,6 @@
   <p:clrMapOvr>
     <a:masterClrMapping/>
   </p:clrMapOvr>
-  <p:timing>
-    <p:tnLst>
-      <p:par>
-        <p:cTn id="1" dur="indefinite" restart="never" nodeType="tmRoot"/>
-      </p:par>
-    </p:tnLst>
-  </p:timing>
 </p:sld>
 </file>
 
@@ -7191,7 +7129,7 @@
               <a:buNone/>
             </a:pPr>
             <a:r>
-              <a:rPr lang="en" dirty="0" smtClean="0"/>
+              <a:rPr lang="en" dirty="0"/>
               <a:t>Limitaciones</a:t>
             </a:r>
             <a:endParaRPr dirty="0">
@@ -7253,11 +7191,7 @@
             </a:pPr>
             <a:r>
               <a:rPr lang="es-SV" dirty="0"/>
-              <a:t>El servicio de soporte técnico se implementará únicamente a través de chat y sección de preguntas frecuentes</a:t>
-            </a:r>
-            <a:r>
-              <a:rPr lang="es-SV" dirty="0" smtClean="0"/>
-              <a:t>.</a:t>
+              <a:t>El servicio de soporte técnico se implementará únicamente a través de chat y sección de preguntas frecuentes.</a:t>
             </a:r>
             <a:endParaRPr lang="es-SV" sz="1000" dirty="0"/>
           </a:p>
@@ -7272,11 +7206,7 @@
             </a:pPr>
             <a:r>
               <a:rPr lang="es-SV" dirty="0"/>
-              <a:t>No se utilizará una base de datos</a:t>
-            </a:r>
-            <a:r>
-              <a:rPr lang="es-SV" dirty="0" smtClean="0"/>
-              <a:t>.</a:t>
+              <a:t>No se utilizará una base de datos.</a:t>
             </a:r>
           </a:p>
           <a:p>
@@ -7290,11 +7220,7 @@
             </a:pPr>
             <a:r>
               <a:rPr lang="es-SV" dirty="0"/>
-              <a:t>El sitio web se limitará a ofrecer un sistema de soluciones rápido y eficiente a los </a:t>
-            </a:r>
-            <a:r>
-              <a:rPr lang="es-SV" dirty="0" smtClean="0"/>
-              <a:t>usuarios.</a:t>
+              <a:t>El sitio web se limitará a ofrecer un sistema de soluciones rápido y eficiente a los usuarios.</a:t>
             </a:r>
           </a:p>
         </p:txBody>
@@ -7309,13 +7235,6 @@
   <p:clrMapOvr>
     <a:masterClrMapping/>
   </p:clrMapOvr>
-  <p:timing>
-    <p:tnLst>
-      <p:par>
-        <p:cTn id="1" dur="indefinite" restart="never" nodeType="tmRoot"/>
-      </p:par>
-    </p:tnLst>
-  </p:timing>
 </p:sld>
 </file>
 
@@ -7371,7 +7290,7 @@
               <a:buNone/>
             </a:pPr>
             <a:r>
-              <a:rPr lang="en" dirty="0" smtClean="0">
+              <a:rPr lang="en" dirty="0">
                 <a:solidFill>
                   <a:schemeClr val="accent3"/>
                 </a:solidFill>
@@ -7379,7 +7298,7 @@
               <a:t>Mapa del </a:t>
             </a:r>
             <a:r>
-              <a:rPr lang="en" dirty="0" smtClean="0"/>
+              <a:rPr lang="en" dirty="0"/>
               <a:t>Sitio Web</a:t>
             </a:r>
             <a:endParaRPr dirty="0"/>
@@ -7474,7 +7393,7 @@
               <a:buNone/>
             </a:pPr>
             <a:r>
-              <a:rPr lang="en" dirty="0" smtClean="0">
+              <a:rPr lang="en" dirty="0">
                 <a:solidFill>
                   <a:schemeClr val="accent3"/>
                 </a:solidFill>
@@ -7482,7 +7401,7 @@
               <a:t>Diseño del</a:t>
             </a:r>
             <a:r>
-              <a:rPr lang="en" dirty="0" smtClean="0"/>
+              <a:rPr lang="en" dirty="0"/>
               <a:t> Sitio Web</a:t>
             </a:r>
             <a:endParaRPr dirty="0"/>
@@ -7560,13 +7479,6 @@
   <p:clrMapOvr>
     <a:masterClrMapping/>
   </p:clrMapOvr>
-  <p:timing>
-    <p:tnLst>
-      <p:par>
-        <p:cTn id="1" dur="indefinite" restart="never" nodeType="tmRoot"/>
-      </p:par>
-    </p:tnLst>
-  </p:timing>
 </p:sld>
 </file>
 
@@ -7622,7 +7534,7 @@
               <a:buNone/>
             </a:pPr>
             <a:r>
-              <a:rPr lang="en" dirty="0" smtClean="0">
+              <a:rPr lang="en" dirty="0">
                 <a:solidFill>
                   <a:schemeClr val="accent3"/>
                 </a:solidFill>
@@ -7630,7 +7542,7 @@
               <a:t>Diseño del</a:t>
             </a:r>
             <a:r>
-              <a:rPr lang="en" dirty="0" smtClean="0"/>
+              <a:rPr lang="en" dirty="0"/>
               <a:t> Sitio Web</a:t>
             </a:r>
             <a:endParaRPr dirty="0"/>
@@ -7713,13 +7625,6 @@
   <p:clrMapOvr>
     <a:masterClrMapping/>
   </p:clrMapOvr>
-  <p:timing>
-    <p:tnLst>
-      <p:par>
-        <p:cTn id="1" dur="indefinite" restart="never" nodeType="tmRoot"/>
-      </p:par>
-    </p:tnLst>
-  </p:timing>
 </p:sld>
 </file>
 
@@ -7775,7 +7680,7 @@
               <a:buNone/>
             </a:pPr>
             <a:r>
-              <a:rPr lang="en" dirty="0" smtClean="0">
+              <a:rPr lang="en" dirty="0">
                 <a:solidFill>
                   <a:schemeClr val="accent3"/>
                 </a:solidFill>
@@ -7783,7 +7688,7 @@
               <a:t>Diseño del</a:t>
             </a:r>
             <a:r>
-              <a:rPr lang="en" dirty="0" smtClean="0"/>
+              <a:rPr lang="en" dirty="0"/>
               <a:t> Sitio Web</a:t>
             </a:r>
             <a:endParaRPr dirty="0"/>
@@ -7861,13 +7766,6 @@
   <p:clrMapOvr>
     <a:masterClrMapping/>
   </p:clrMapOvr>
-  <p:timing>
-    <p:tnLst>
-      <p:par>
-        <p:cTn id="1" dur="indefinite" restart="never" nodeType="tmRoot"/>
-      </p:par>
-    </p:tnLst>
-  </p:timing>
 </p:sld>
 </file>
 
@@ -7882,7 +7780,7 @@
           </a:blip>
           <a:srcRect/>
           <a:stretch>
-            <a:fillRect l="-6000" r="-6000"/>
+            <a:fillRect/>
           </a:stretch>
         </a:blipFill>
         <a:effectLst/>
@@ -7909,13 +7807,13 @@
             <a:spLocks noGrp="1"/>
           </p:cNvSpPr>
           <p:nvPr>
-            <p:ph type="title"/>
+            <p:ph type="title" idx="4294967295"/>
           </p:nvPr>
         </p:nvSpPr>
         <p:spPr>
           <a:xfrm>
-            <a:off x="1668666" y="4169100"/>
-            <a:ext cx="5766000" cy="974400"/>
+            <a:off x="4572000" y="448185"/>
+            <a:ext cx="4439798" cy="974725"/>
           </a:xfrm>
           <a:prstGeom prst="rect">
             <a:avLst/>
@@ -7937,22 +7835,13 @@
               <a:buNone/>
             </a:pPr>
             <a:r>
-              <a:rPr lang="en" dirty="0" smtClean="0"/>
-              <a:t>Muestra </a:t>
+              <a:rPr lang="es-SV" dirty="0">
+                <a:solidFill>
+                  <a:schemeClr val="bg1"/>
+                </a:solidFill>
+              </a:rPr>
+              <a:t>Muestra del Home…</a:t>
             </a:r>
-            <a:r>
-              <a:rPr lang="en" dirty="0" smtClean="0">
-                <a:solidFill>
-                  <a:schemeClr val="accent3"/>
-                </a:solidFill>
-              </a:rPr>
-              <a:t>del Home…</a:t>
-            </a:r>
-            <a:endParaRPr dirty="0">
-              <a:solidFill>
-                <a:schemeClr val="accent3"/>
-              </a:solidFill>
-            </a:endParaRPr>
           </a:p>
         </p:txBody>
       </p:sp>
@@ -7961,13 +7850,6 @@
   <p:clrMapOvr>
     <a:masterClrMapping/>
   </p:clrMapOvr>
-  <p:timing>
-    <p:tnLst>
-      <p:par>
-        <p:cTn id="1" dur="indefinite" restart="never" nodeType="tmRoot"/>
-      </p:par>
-    </p:tnLst>
-  </p:timing>
 </p:sld>
 </file>
 

</xml_diff>